<commit_message>
commited at 2020-04-21 05:53:19.506788
</commit_message>
<xml_diff>
--- a/Presentations/COVID-19 19-04-2020.pptx
+++ b/Presentations/COVID-19 19-04-2020.pptx
@@ -38,6 +38,8 @@
     <p:sldId id="286" r:id="rId37"/>
     <p:sldId id="287" r:id="rId38"/>
     <p:sldId id="288" r:id="rId39"/>
+    <p:sldId id="289" r:id="rId40"/>
+    <p:sldId id="290" r:id="rId41"/>
   </p:sldIdLst>
   <p:sldSz cx="9144000" cy="6858000" type="screen4x3"/>
   <p:notesSz cx="6858000" cy="9144000"/>
@@ -5254,6 +5256,158 @@
           <a:xfrm>
             <a:off x="457200" y="685800"/>
             <a:ext cx="8229600" cy="5486400"/>
+          </a:xfrm>
+          <a:prstGeom prst="rect">
+            <a:avLst/>
+          </a:prstGeom>
+        </p:spPr>
+      </p:pic>
+    </p:spTree>
+  </p:cSld>
+  <p:clrMapOvr>
+    <a:masterClrMapping/>
+  </p:clrMapOvr>
+</p:sld>
+</file>
+
+<file path=ppt/slides/slide34.xml><?xml version="1.0" encoding="utf-8"?>
+<p:sld xmlns:a="http://schemas.openxmlformats.org/drawingml/2006/main" xmlns:p="http://schemas.openxmlformats.org/presentationml/2006/main" xmlns:r="http://schemas.openxmlformats.org/officeDocument/2006/relationships">
+  <p:cSld>
+    <p:spTree>
+      <p:nvGrpSpPr>
+        <p:cNvPr id="1" name=""/>
+        <p:cNvGrpSpPr/>
+        <p:nvPr/>
+      </p:nvGrpSpPr>
+      <p:grpSpPr/>
+      <p:sp>
+        <p:nvSpPr>
+          <p:cNvPr id="2" name="Title 1"/>
+          <p:cNvSpPr>
+            <a:spLocks noGrp="1"/>
+          </p:cNvSpPr>
+          <p:nvPr>
+            <p:ph type="title"/>
+          </p:nvPr>
+        </p:nvSpPr>
+        <p:spPr/>
+        <p:txBody>
+          <a:bodyPr/>
+          <a:lstStyle/>
+          <a:p/>
+        </p:txBody>
+      </p:sp>
+      <p:sp>
+        <p:nvSpPr>
+          <p:cNvPr id="4" name="Text Placeholder 3"/>
+          <p:cNvSpPr>
+            <a:spLocks noGrp="1"/>
+          </p:cNvSpPr>
+          <p:nvPr>
+            <p:ph type="body" idx="2" sz="half"/>
+          </p:nvPr>
+        </p:nvSpPr>
+        <p:spPr/>
+        <p:txBody>
+          <a:bodyPr/>
+          <a:lstStyle/>
+          <a:p/>
+        </p:txBody>
+      </p:sp>
+      <p:pic>
+        <p:nvPicPr>
+          <p:cNvPr id="5" name="Picture 4" descr="image.png"/>
+          <p:cNvPicPr>
+            <a:picLocks noChangeAspect="1"/>
+          </p:cNvPicPr>
+          <p:nvPr/>
+        </p:nvPicPr>
+        <p:blipFill>
+          <a:blip r:embed="rId2"/>
+          <a:stretch>
+            <a:fillRect/>
+          </a:stretch>
+        </p:blipFill>
+        <p:spPr>
+          <a:xfrm>
+            <a:off x="457200" y="685800"/>
+            <a:ext cx="8229600" cy="5486400"/>
+          </a:xfrm>
+          <a:prstGeom prst="rect">
+            <a:avLst/>
+          </a:prstGeom>
+        </p:spPr>
+      </p:pic>
+    </p:spTree>
+  </p:cSld>
+  <p:clrMapOvr>
+    <a:masterClrMapping/>
+  </p:clrMapOvr>
+</p:sld>
+</file>
+
+<file path=ppt/slides/slide35.xml><?xml version="1.0" encoding="utf-8"?>
+<p:sld xmlns:a="http://schemas.openxmlformats.org/drawingml/2006/main" xmlns:p="http://schemas.openxmlformats.org/presentationml/2006/main" xmlns:r="http://schemas.openxmlformats.org/officeDocument/2006/relationships">
+  <p:cSld>
+    <p:spTree>
+      <p:nvGrpSpPr>
+        <p:cNvPr id="1" name=""/>
+        <p:cNvGrpSpPr/>
+        <p:nvPr/>
+      </p:nvGrpSpPr>
+      <p:grpSpPr/>
+      <p:sp>
+        <p:nvSpPr>
+          <p:cNvPr id="2" name="Title 1"/>
+          <p:cNvSpPr>
+            <a:spLocks noGrp="1"/>
+          </p:cNvSpPr>
+          <p:nvPr>
+            <p:ph type="title"/>
+          </p:nvPr>
+        </p:nvSpPr>
+        <p:spPr/>
+        <p:txBody>
+          <a:bodyPr/>
+          <a:lstStyle/>
+          <a:p/>
+        </p:txBody>
+      </p:sp>
+      <p:sp>
+        <p:nvSpPr>
+          <p:cNvPr id="4" name="Text Placeholder 3"/>
+          <p:cNvSpPr>
+            <a:spLocks noGrp="1"/>
+          </p:cNvSpPr>
+          <p:nvPr>
+            <p:ph type="body" idx="2" sz="half"/>
+          </p:nvPr>
+        </p:nvSpPr>
+        <p:spPr/>
+        <p:txBody>
+          <a:bodyPr/>
+          <a:lstStyle/>
+          <a:p/>
+        </p:txBody>
+      </p:sp>
+      <p:pic>
+        <p:nvPicPr>
+          <p:cNvPr id="5" name="Picture 4" descr="image.png"/>
+          <p:cNvPicPr>
+            <a:picLocks noChangeAspect="1"/>
+          </p:cNvPicPr>
+          <p:nvPr/>
+        </p:nvPicPr>
+        <p:blipFill>
+          <a:blip r:embed="rId2"/>
+          <a:stretch>
+            <a:fillRect/>
+          </a:stretch>
+        </p:blipFill>
+        <p:spPr>
+          <a:xfrm>
+            <a:off x="457200" y="896815"/>
+            <a:ext cx="8229600" cy="5064369"/>
           </a:xfrm>
           <a:prstGeom prst="rect">
             <a:avLst/>

</xml_diff>